<commit_message>
compress to 6 pages
</commit_message>
<xml_diff>
--- a/paper draft/figs/deadlock.pptx
+++ b/paper draft/figs/deadlock.pptx
@@ -3097,894 +3097,97 @@
       </p:grpSpPr>
       <p:grpSp>
         <p:nvGrpSpPr>
-          <p:cNvPr id="91" name="Group 90"/>
+          <p:cNvPr id="24" name="Group 23"/>
           <p:cNvGrpSpPr/>
           <p:nvPr/>
         </p:nvGrpSpPr>
         <p:grpSpPr>
           <a:xfrm>
-            <a:off x="2943122" y="2040536"/>
-            <a:ext cx="4540002" cy="2450420"/>
-            <a:chOff x="2943122" y="2040536"/>
-            <a:chExt cx="4540002" cy="2450420"/>
+            <a:off x="5211457" y="2320439"/>
+            <a:ext cx="1999242" cy="580825"/>
+            <a:chOff x="5285176" y="2108083"/>
+            <a:chExt cx="1999242" cy="580825"/>
           </a:xfrm>
         </p:grpSpPr>
-        <p:grpSp>
-          <p:nvGrpSpPr>
-            <p:cNvPr id="24" name="Group 23"/>
-            <p:cNvGrpSpPr/>
-            <p:nvPr/>
-          </p:nvGrpSpPr>
-          <p:grpSpPr>
-            <a:xfrm>
-              <a:off x="5200509" y="2046714"/>
-              <a:ext cx="1999242" cy="580825"/>
-              <a:chOff x="5285176" y="2108083"/>
-              <a:chExt cx="1999242" cy="580825"/>
-            </a:xfrm>
-          </p:grpSpPr>
-          <p:sp>
-            <p:nvSpPr>
-              <p:cNvPr id="7" name="Rectangle 6"/>
-              <p:cNvSpPr/>
-              <p:nvPr/>
-            </p:nvSpPr>
-            <p:spPr>
-              <a:xfrm rot="5400000">
-                <a:off x="5540344" y="2437219"/>
-                <a:ext cx="136168" cy="344824"/>
-              </a:xfrm>
-              <a:prstGeom prst="rect">
-                <a:avLst/>
-              </a:prstGeom>
-              <a:solidFill>
-                <a:schemeClr val="accent1">
-                  <a:lumMod val="60000"/>
-                  <a:lumOff val="40000"/>
-                </a:schemeClr>
-              </a:solidFill>
-              <a:ln w="12700">
-                <a:solidFill>
-                  <a:schemeClr val="tx1"/>
-                </a:solidFill>
-              </a:ln>
-            </p:spPr>
-            <p:style>
-              <a:lnRef idx="2">
-                <a:schemeClr val="accent1">
-                  <a:shade val="50000"/>
-                </a:schemeClr>
-              </a:lnRef>
-              <a:fillRef idx="1">
-                <a:schemeClr val="accent1"/>
-              </a:fillRef>
-              <a:effectRef idx="0">
-                <a:schemeClr val="accent1"/>
-              </a:effectRef>
-              <a:fontRef idx="minor">
-                <a:schemeClr val="lt1"/>
-              </a:fontRef>
-            </p:style>
-            <p:txBody>
-              <a:bodyPr rtlCol="0" anchor="ctr"/>
-              <a:lstStyle/>
-              <a:p>
-                <a:pPr algn="ctr"/>
-                <a:endParaRPr lang="en-US" sz="1200" dirty="0"/>
-              </a:p>
-            </p:txBody>
-          </p:sp>
-          <p:cxnSp>
-            <p:nvCxnSpPr>
-              <p:cNvPr id="11" name="Straight Connector 10"/>
-              <p:cNvCxnSpPr/>
-              <p:nvPr/>
-            </p:nvCxnSpPr>
-            <p:spPr>
-              <a:xfrm>
-                <a:off x="5436017" y="2123061"/>
-                <a:ext cx="0" cy="554653"/>
-              </a:xfrm>
-              <a:prstGeom prst="line">
-                <a:avLst/>
-              </a:prstGeom>
-              <a:ln w="25400">
-                <a:solidFill>
-                  <a:schemeClr val="tx1"/>
-                </a:solidFill>
-              </a:ln>
-            </p:spPr>
-            <p:style>
-              <a:lnRef idx="1">
-                <a:schemeClr val="accent1"/>
-              </a:lnRef>
-              <a:fillRef idx="0">
-                <a:schemeClr val="accent1"/>
-              </a:fillRef>
-              <a:effectRef idx="0">
-                <a:schemeClr val="accent1"/>
-              </a:effectRef>
-              <a:fontRef idx="minor">
-                <a:schemeClr val="tx1"/>
-              </a:fontRef>
-            </p:style>
-          </p:cxnSp>
-          <p:cxnSp>
-            <p:nvCxnSpPr>
-              <p:cNvPr id="13" name="Straight Connector 12"/>
-              <p:cNvCxnSpPr/>
-              <p:nvPr/>
-            </p:nvCxnSpPr>
-            <p:spPr>
-              <a:xfrm>
-                <a:off x="5780841" y="2134255"/>
-                <a:ext cx="0" cy="554653"/>
-              </a:xfrm>
-              <a:prstGeom prst="line">
-                <a:avLst/>
-              </a:prstGeom>
-              <a:ln w="25400">
-                <a:solidFill>
-                  <a:schemeClr val="tx1"/>
-                </a:solidFill>
-              </a:ln>
-            </p:spPr>
-            <p:style>
-              <a:lnRef idx="1">
-                <a:schemeClr val="accent1"/>
-              </a:lnRef>
-              <a:fillRef idx="0">
-                <a:schemeClr val="accent1"/>
-              </a:fillRef>
-              <a:effectRef idx="0">
-                <a:schemeClr val="accent1"/>
-              </a:effectRef>
-              <a:fontRef idx="minor">
-                <a:schemeClr val="tx1"/>
-              </a:fontRef>
-            </p:style>
-          </p:cxnSp>
-          <p:sp>
-            <p:nvSpPr>
-              <p:cNvPr id="14" name="Rectangle 13"/>
-              <p:cNvSpPr/>
-              <p:nvPr/>
-            </p:nvSpPr>
-            <p:spPr>
-              <a:xfrm rot="5400000">
-                <a:off x="5540345" y="2301051"/>
-                <a:ext cx="136168" cy="344824"/>
-              </a:xfrm>
-              <a:prstGeom prst="rect">
-                <a:avLst/>
-              </a:prstGeom>
-              <a:solidFill>
-                <a:schemeClr val="accent1">
-                  <a:lumMod val="60000"/>
-                  <a:lumOff val="40000"/>
-                </a:schemeClr>
-              </a:solidFill>
-              <a:ln w="12700">
-                <a:solidFill>
-                  <a:schemeClr val="tx1"/>
-                </a:solidFill>
-              </a:ln>
-            </p:spPr>
-            <p:style>
-              <a:lnRef idx="2">
-                <a:schemeClr val="accent1">
-                  <a:shade val="50000"/>
-                </a:schemeClr>
-              </a:lnRef>
-              <a:fillRef idx="1">
-                <a:schemeClr val="accent1"/>
-              </a:fillRef>
-              <a:effectRef idx="0">
-                <a:schemeClr val="accent1"/>
-              </a:effectRef>
-              <a:fontRef idx="minor">
-                <a:schemeClr val="lt1"/>
-              </a:fontRef>
-            </p:style>
-            <p:txBody>
-              <a:bodyPr rtlCol="0" anchor="ctr"/>
-              <a:lstStyle/>
-              <a:p>
-                <a:pPr algn="ctr"/>
-                <a:endParaRPr lang="en-US" sz="1200" dirty="0"/>
-              </a:p>
-            </p:txBody>
-          </p:sp>
-          <p:sp>
-            <p:nvSpPr>
-              <p:cNvPr id="15" name="Rectangle 14"/>
-              <p:cNvSpPr/>
-              <p:nvPr/>
-            </p:nvSpPr>
-            <p:spPr>
-              <a:xfrm rot="5400000">
-                <a:off x="5540345" y="2167449"/>
-                <a:ext cx="136168" cy="344824"/>
-              </a:xfrm>
-              <a:prstGeom prst="rect">
-                <a:avLst/>
-              </a:prstGeom>
-              <a:solidFill>
-                <a:schemeClr val="accent1">
-                  <a:lumMod val="60000"/>
-                  <a:lumOff val="40000"/>
-                </a:schemeClr>
-              </a:solidFill>
-              <a:ln w="12700">
-                <a:solidFill>
-                  <a:schemeClr val="tx1"/>
-                </a:solidFill>
-              </a:ln>
-            </p:spPr>
-            <p:style>
-              <a:lnRef idx="2">
-                <a:schemeClr val="accent1">
-                  <a:shade val="50000"/>
-                </a:schemeClr>
-              </a:lnRef>
-              <a:fillRef idx="1">
-                <a:schemeClr val="accent1"/>
-              </a:fillRef>
-              <a:effectRef idx="0">
-                <a:schemeClr val="accent1"/>
-              </a:effectRef>
-              <a:fontRef idx="minor">
-                <a:schemeClr val="lt1"/>
-              </a:fontRef>
-            </p:style>
-            <p:txBody>
-              <a:bodyPr rtlCol="0" anchor="ctr"/>
-              <a:lstStyle/>
-              <a:p>
-                <a:pPr algn="ctr"/>
-                <a:endParaRPr lang="en-US" sz="1200" dirty="0"/>
-              </a:p>
-            </p:txBody>
-          </p:sp>
-          <p:cxnSp>
-            <p:nvCxnSpPr>
-              <p:cNvPr id="16" name="Straight Connector 15"/>
-              <p:cNvCxnSpPr/>
-              <p:nvPr/>
-            </p:nvCxnSpPr>
-            <p:spPr>
-              <a:xfrm>
-                <a:off x="5285176" y="2271777"/>
-                <a:ext cx="696908" cy="0"/>
-              </a:xfrm>
-              <a:prstGeom prst="line">
-                <a:avLst/>
-              </a:prstGeom>
-              <a:ln w="50800">
-                <a:solidFill>
-                  <a:srgbClr val="FF0000"/>
-                </a:solidFill>
-                <a:prstDash val="sysDash"/>
-              </a:ln>
-            </p:spPr>
-            <p:style>
-              <a:lnRef idx="1">
-                <a:schemeClr val="accent1"/>
-              </a:lnRef>
-              <a:fillRef idx="0">
-                <a:schemeClr val="accent1"/>
-              </a:fillRef>
-              <a:effectRef idx="0">
-                <a:schemeClr val="accent1"/>
-              </a:effectRef>
-              <a:fontRef idx="minor">
-                <a:schemeClr val="tx1"/>
-              </a:fontRef>
-            </p:style>
-          </p:cxnSp>
-          <p:sp>
-            <p:nvSpPr>
-              <p:cNvPr id="21" name="TextBox 20"/>
-              <p:cNvSpPr txBox="1"/>
-              <p:nvPr/>
-            </p:nvSpPr>
-            <p:spPr>
-              <a:xfrm>
-                <a:off x="5908001" y="2108083"/>
-                <a:ext cx="1376417" cy="307777"/>
-              </a:xfrm>
-              <a:prstGeom prst="rect">
-                <a:avLst/>
-              </a:prstGeom>
-              <a:noFill/>
-            </p:spPr>
-            <p:txBody>
-              <a:bodyPr wrap="square" rtlCol="0">
-                <a:spAutoFit/>
-              </a:bodyPr>
-              <a:lstStyle/>
-              <a:p>
-                <a:r>
-                  <a:rPr lang="en-US" sz="1400" dirty="0" smtClean="0"/>
-                  <a:t>PFC threshold</a:t>
-                </a:r>
-                <a:endParaRPr lang="en-US" sz="1400" dirty="0"/>
-              </a:p>
-            </p:txBody>
-          </p:sp>
-        </p:grpSp>
-        <p:grpSp>
-          <p:nvGrpSpPr>
-            <p:cNvPr id="25" name="Group 24"/>
-            <p:cNvGrpSpPr/>
-            <p:nvPr/>
-          </p:nvGrpSpPr>
-          <p:grpSpPr>
-            <a:xfrm>
-              <a:off x="3531060" y="3615980"/>
-              <a:ext cx="344825" cy="565847"/>
-              <a:chOff x="5436016" y="2123061"/>
-              <a:chExt cx="344825" cy="565847"/>
-            </a:xfrm>
-          </p:grpSpPr>
-          <p:sp>
-            <p:nvSpPr>
-              <p:cNvPr id="26" name="Rectangle 25"/>
-              <p:cNvSpPr/>
-              <p:nvPr/>
-            </p:nvSpPr>
-            <p:spPr>
-              <a:xfrm rot="5400000">
-                <a:off x="5540344" y="2437219"/>
-                <a:ext cx="136168" cy="344824"/>
-              </a:xfrm>
-              <a:prstGeom prst="rect">
-                <a:avLst/>
-              </a:prstGeom>
-              <a:solidFill>
-                <a:schemeClr val="accent1">
-                  <a:lumMod val="60000"/>
-                  <a:lumOff val="40000"/>
-                </a:schemeClr>
-              </a:solidFill>
-              <a:ln w="12700">
-                <a:solidFill>
-                  <a:schemeClr val="tx1"/>
-                </a:solidFill>
-              </a:ln>
-            </p:spPr>
-            <p:style>
-              <a:lnRef idx="2">
-                <a:schemeClr val="accent1">
-                  <a:shade val="50000"/>
-                </a:schemeClr>
-              </a:lnRef>
-              <a:fillRef idx="1">
-                <a:schemeClr val="accent1"/>
-              </a:fillRef>
-              <a:effectRef idx="0">
-                <a:schemeClr val="accent1"/>
-              </a:effectRef>
-              <a:fontRef idx="minor">
-                <a:schemeClr val="lt1"/>
-              </a:fontRef>
-            </p:style>
-            <p:txBody>
-              <a:bodyPr rtlCol="0" anchor="ctr"/>
-              <a:lstStyle/>
-              <a:p>
-                <a:pPr algn="ctr"/>
-                <a:endParaRPr lang="en-US" sz="1200" dirty="0"/>
-              </a:p>
-            </p:txBody>
-          </p:sp>
-          <p:cxnSp>
-            <p:nvCxnSpPr>
-              <p:cNvPr id="27" name="Straight Connector 26"/>
-              <p:cNvCxnSpPr/>
-              <p:nvPr/>
-            </p:nvCxnSpPr>
-            <p:spPr>
-              <a:xfrm>
-                <a:off x="5436017" y="2123061"/>
-                <a:ext cx="0" cy="554653"/>
-              </a:xfrm>
-              <a:prstGeom prst="line">
-                <a:avLst/>
-              </a:prstGeom>
-              <a:ln w="25400">
-                <a:solidFill>
-                  <a:schemeClr val="tx1"/>
-                </a:solidFill>
-              </a:ln>
-            </p:spPr>
-            <p:style>
-              <a:lnRef idx="1">
-                <a:schemeClr val="accent1"/>
-              </a:lnRef>
-              <a:fillRef idx="0">
-                <a:schemeClr val="accent1"/>
-              </a:fillRef>
-              <a:effectRef idx="0">
-                <a:schemeClr val="accent1"/>
-              </a:effectRef>
-              <a:fontRef idx="minor">
-                <a:schemeClr val="tx1"/>
-              </a:fontRef>
-            </p:style>
-          </p:cxnSp>
-          <p:cxnSp>
-            <p:nvCxnSpPr>
-              <p:cNvPr id="28" name="Straight Connector 27"/>
-              <p:cNvCxnSpPr/>
-              <p:nvPr/>
-            </p:nvCxnSpPr>
-            <p:spPr>
-              <a:xfrm>
-                <a:off x="5780841" y="2134255"/>
-                <a:ext cx="0" cy="554653"/>
-              </a:xfrm>
-              <a:prstGeom prst="line">
-                <a:avLst/>
-              </a:prstGeom>
-              <a:ln w="25400">
-                <a:solidFill>
-                  <a:schemeClr val="tx1"/>
-                </a:solidFill>
-              </a:ln>
-            </p:spPr>
-            <p:style>
-              <a:lnRef idx="1">
-                <a:schemeClr val="accent1"/>
-              </a:lnRef>
-              <a:fillRef idx="0">
-                <a:schemeClr val="accent1"/>
-              </a:fillRef>
-              <a:effectRef idx="0">
-                <a:schemeClr val="accent1"/>
-              </a:effectRef>
-              <a:fontRef idx="minor">
-                <a:schemeClr val="tx1"/>
-              </a:fontRef>
-            </p:style>
-          </p:cxnSp>
-          <p:sp>
-            <p:nvSpPr>
-              <p:cNvPr id="29" name="Rectangle 28"/>
-              <p:cNvSpPr/>
-              <p:nvPr/>
-            </p:nvSpPr>
-            <p:spPr>
-              <a:xfrm rot="5400000">
-                <a:off x="5540345" y="2301051"/>
-                <a:ext cx="136168" cy="344824"/>
-              </a:xfrm>
-              <a:prstGeom prst="rect">
-                <a:avLst/>
-              </a:prstGeom>
-              <a:solidFill>
-                <a:schemeClr val="accent1">
-                  <a:lumMod val="60000"/>
-                  <a:lumOff val="40000"/>
-                </a:schemeClr>
-              </a:solidFill>
-              <a:ln w="12700">
-                <a:solidFill>
-                  <a:schemeClr val="tx1"/>
-                </a:solidFill>
-              </a:ln>
-            </p:spPr>
-            <p:style>
-              <a:lnRef idx="2">
-                <a:schemeClr val="accent1">
-                  <a:shade val="50000"/>
-                </a:schemeClr>
-              </a:lnRef>
-              <a:fillRef idx="1">
-                <a:schemeClr val="accent1"/>
-              </a:fillRef>
-              <a:effectRef idx="0">
-                <a:schemeClr val="accent1"/>
-              </a:effectRef>
-              <a:fontRef idx="minor">
-                <a:schemeClr val="lt1"/>
-              </a:fontRef>
-            </p:style>
-            <p:txBody>
-              <a:bodyPr rtlCol="0" anchor="ctr"/>
-              <a:lstStyle/>
-              <a:p>
-                <a:pPr algn="ctr"/>
-                <a:endParaRPr lang="en-US" sz="1200" dirty="0"/>
-              </a:p>
-            </p:txBody>
-          </p:sp>
-          <p:sp>
-            <p:nvSpPr>
-              <p:cNvPr id="30" name="Rectangle 29"/>
-              <p:cNvSpPr/>
-              <p:nvPr/>
-            </p:nvSpPr>
-            <p:spPr>
-              <a:xfrm rot="5400000">
-                <a:off x="5540345" y="2167449"/>
-                <a:ext cx="136168" cy="344824"/>
-              </a:xfrm>
-              <a:prstGeom prst="rect">
-                <a:avLst/>
-              </a:prstGeom>
-              <a:solidFill>
-                <a:schemeClr val="accent1">
-                  <a:lumMod val="60000"/>
-                  <a:lumOff val="40000"/>
-                </a:schemeClr>
-              </a:solidFill>
-              <a:ln w="12700">
-                <a:solidFill>
-                  <a:schemeClr val="tx1"/>
-                </a:solidFill>
-              </a:ln>
-            </p:spPr>
-            <p:style>
-              <a:lnRef idx="2">
-                <a:schemeClr val="accent1">
-                  <a:shade val="50000"/>
-                </a:schemeClr>
-              </a:lnRef>
-              <a:fillRef idx="1">
-                <a:schemeClr val="accent1"/>
-              </a:fillRef>
-              <a:effectRef idx="0">
-                <a:schemeClr val="accent1"/>
-              </a:effectRef>
-              <a:fontRef idx="minor">
-                <a:schemeClr val="lt1"/>
-              </a:fontRef>
-            </p:style>
-            <p:txBody>
-              <a:bodyPr rtlCol="0" anchor="ctr"/>
-              <a:lstStyle/>
-              <a:p>
-                <a:pPr algn="ctr"/>
-                <a:endParaRPr lang="en-US" sz="1200" dirty="0"/>
-              </a:p>
-            </p:txBody>
-          </p:sp>
-        </p:grpSp>
-        <p:grpSp>
-          <p:nvGrpSpPr>
-            <p:cNvPr id="33" name="Group 32"/>
-            <p:cNvGrpSpPr/>
-            <p:nvPr/>
-          </p:nvGrpSpPr>
-          <p:grpSpPr>
-            <a:xfrm>
-              <a:off x="6401129" y="3599340"/>
-              <a:ext cx="344825" cy="565847"/>
-              <a:chOff x="5436016" y="2123061"/>
-              <a:chExt cx="344825" cy="565847"/>
-            </a:xfrm>
-          </p:grpSpPr>
-          <p:sp>
-            <p:nvSpPr>
-              <p:cNvPr id="34" name="Rectangle 33"/>
-              <p:cNvSpPr/>
-              <p:nvPr/>
-            </p:nvSpPr>
-            <p:spPr>
-              <a:xfrm rot="5400000">
-                <a:off x="5540344" y="2437219"/>
-                <a:ext cx="136168" cy="344824"/>
-              </a:xfrm>
-              <a:prstGeom prst="rect">
-                <a:avLst/>
-              </a:prstGeom>
-              <a:solidFill>
-                <a:schemeClr val="accent1">
-                  <a:lumMod val="60000"/>
-                  <a:lumOff val="40000"/>
-                </a:schemeClr>
-              </a:solidFill>
-              <a:ln w="12700">
-                <a:solidFill>
-                  <a:schemeClr val="tx1"/>
-                </a:solidFill>
-              </a:ln>
-            </p:spPr>
-            <p:style>
-              <a:lnRef idx="2">
-                <a:schemeClr val="accent1">
-                  <a:shade val="50000"/>
-                </a:schemeClr>
-              </a:lnRef>
-              <a:fillRef idx="1">
-                <a:schemeClr val="accent1"/>
-              </a:fillRef>
-              <a:effectRef idx="0">
-                <a:schemeClr val="accent1"/>
-              </a:effectRef>
-              <a:fontRef idx="minor">
-                <a:schemeClr val="lt1"/>
-              </a:fontRef>
-            </p:style>
-            <p:txBody>
-              <a:bodyPr rtlCol="0" anchor="ctr"/>
-              <a:lstStyle/>
-              <a:p>
-                <a:pPr algn="ctr"/>
-                <a:endParaRPr lang="en-US" sz="1200" dirty="0"/>
-              </a:p>
-            </p:txBody>
-          </p:sp>
-          <p:cxnSp>
-            <p:nvCxnSpPr>
-              <p:cNvPr id="35" name="Straight Connector 34"/>
-              <p:cNvCxnSpPr/>
-              <p:nvPr/>
-            </p:nvCxnSpPr>
-            <p:spPr>
-              <a:xfrm>
-                <a:off x="5436017" y="2123061"/>
-                <a:ext cx="0" cy="554653"/>
-              </a:xfrm>
-              <a:prstGeom prst="line">
-                <a:avLst/>
-              </a:prstGeom>
-              <a:ln w="25400">
-                <a:solidFill>
-                  <a:schemeClr val="tx1"/>
-                </a:solidFill>
-              </a:ln>
-            </p:spPr>
-            <p:style>
-              <a:lnRef idx="1">
-                <a:schemeClr val="accent1"/>
-              </a:lnRef>
-              <a:fillRef idx="0">
-                <a:schemeClr val="accent1"/>
-              </a:fillRef>
-              <a:effectRef idx="0">
-                <a:schemeClr val="accent1"/>
-              </a:effectRef>
-              <a:fontRef idx="minor">
-                <a:schemeClr val="tx1"/>
-              </a:fontRef>
-            </p:style>
-          </p:cxnSp>
-          <p:cxnSp>
-            <p:nvCxnSpPr>
-              <p:cNvPr id="36" name="Straight Connector 35"/>
-              <p:cNvCxnSpPr/>
-              <p:nvPr/>
-            </p:nvCxnSpPr>
-            <p:spPr>
-              <a:xfrm>
-                <a:off x="5780841" y="2134255"/>
-                <a:ext cx="0" cy="554653"/>
-              </a:xfrm>
-              <a:prstGeom prst="line">
-                <a:avLst/>
-              </a:prstGeom>
-              <a:ln w="25400">
-                <a:solidFill>
-                  <a:schemeClr val="tx1"/>
-                </a:solidFill>
-              </a:ln>
-            </p:spPr>
-            <p:style>
-              <a:lnRef idx="1">
-                <a:schemeClr val="accent1"/>
-              </a:lnRef>
-              <a:fillRef idx="0">
-                <a:schemeClr val="accent1"/>
-              </a:fillRef>
-              <a:effectRef idx="0">
-                <a:schemeClr val="accent1"/>
-              </a:effectRef>
-              <a:fontRef idx="minor">
-                <a:schemeClr val="tx1"/>
-              </a:fontRef>
-            </p:style>
-          </p:cxnSp>
-          <p:sp>
-            <p:nvSpPr>
-              <p:cNvPr id="37" name="Rectangle 36"/>
-              <p:cNvSpPr/>
-              <p:nvPr/>
-            </p:nvSpPr>
-            <p:spPr>
-              <a:xfrm rot="5400000">
-                <a:off x="5540345" y="2301051"/>
-                <a:ext cx="136168" cy="344824"/>
-              </a:xfrm>
-              <a:prstGeom prst="rect">
-                <a:avLst/>
-              </a:prstGeom>
-              <a:solidFill>
-                <a:schemeClr val="accent1">
-                  <a:lumMod val="60000"/>
-                  <a:lumOff val="40000"/>
-                </a:schemeClr>
-              </a:solidFill>
-              <a:ln w="12700">
-                <a:solidFill>
-                  <a:schemeClr val="tx1"/>
-                </a:solidFill>
-              </a:ln>
-            </p:spPr>
-            <p:style>
-              <a:lnRef idx="2">
-                <a:schemeClr val="accent1">
-                  <a:shade val="50000"/>
-                </a:schemeClr>
-              </a:lnRef>
-              <a:fillRef idx="1">
-                <a:schemeClr val="accent1"/>
-              </a:fillRef>
-              <a:effectRef idx="0">
-                <a:schemeClr val="accent1"/>
-              </a:effectRef>
-              <a:fontRef idx="minor">
-                <a:schemeClr val="lt1"/>
-              </a:fontRef>
-            </p:style>
-            <p:txBody>
-              <a:bodyPr rtlCol="0" anchor="ctr"/>
-              <a:lstStyle/>
-              <a:p>
-                <a:pPr algn="ctr"/>
-                <a:endParaRPr lang="en-US" sz="1200" dirty="0"/>
-              </a:p>
-            </p:txBody>
-          </p:sp>
-          <p:sp>
-            <p:nvSpPr>
-              <p:cNvPr id="38" name="Rectangle 37"/>
-              <p:cNvSpPr/>
-              <p:nvPr/>
-            </p:nvSpPr>
-            <p:spPr>
-              <a:xfrm rot="5400000">
-                <a:off x="5540345" y="2167449"/>
-                <a:ext cx="136168" cy="344824"/>
-              </a:xfrm>
-              <a:prstGeom prst="rect">
-                <a:avLst/>
-              </a:prstGeom>
-              <a:solidFill>
-                <a:schemeClr val="accent1">
-                  <a:lumMod val="60000"/>
-                  <a:lumOff val="40000"/>
-                </a:schemeClr>
-              </a:solidFill>
-              <a:ln w="12700">
-                <a:solidFill>
-                  <a:schemeClr val="tx1"/>
-                </a:solidFill>
-              </a:ln>
-            </p:spPr>
-            <p:style>
-              <a:lnRef idx="2">
-                <a:schemeClr val="accent1">
-                  <a:shade val="50000"/>
-                </a:schemeClr>
-              </a:lnRef>
-              <a:fillRef idx="1">
-                <a:schemeClr val="accent1"/>
-              </a:fillRef>
-              <a:effectRef idx="0">
-                <a:schemeClr val="accent1"/>
-              </a:effectRef>
-              <a:fontRef idx="minor">
-                <a:schemeClr val="lt1"/>
-              </a:fontRef>
-            </p:style>
-            <p:txBody>
-              <a:bodyPr rtlCol="0" anchor="ctr"/>
-              <a:lstStyle/>
-              <a:p>
-                <a:pPr algn="ctr"/>
-                <a:endParaRPr lang="en-US" sz="1200" dirty="0"/>
-              </a:p>
-            </p:txBody>
-          </p:sp>
-        </p:grpSp>
         <p:sp>
           <p:nvSpPr>
-            <p:cNvPr id="57" name="TextBox 56"/>
-            <p:cNvSpPr txBox="1"/>
+            <p:cNvPr id="7" name="Rectangle 6"/>
+            <p:cNvSpPr/>
             <p:nvPr/>
           </p:nvSpPr>
           <p:spPr>
-            <a:xfrm>
-              <a:off x="4301974" y="2040536"/>
-              <a:ext cx="1016532" cy="584776"/>
+            <a:xfrm rot="5400000">
+              <a:off x="5540344" y="2437219"/>
+              <a:ext cx="136168" cy="344824"/>
             </a:xfrm>
             <a:prstGeom prst="rect">
               <a:avLst/>
             </a:prstGeom>
-            <a:noFill/>
+            <a:solidFill>
+              <a:schemeClr val="accent1">
+                <a:lumMod val="60000"/>
+                <a:lumOff val="40000"/>
+              </a:schemeClr>
+            </a:solidFill>
+            <a:ln w="12700">
+              <a:solidFill>
+                <a:schemeClr val="tx1"/>
+              </a:solidFill>
+            </a:ln>
           </p:spPr>
+          <p:style>
+            <a:lnRef idx="2">
+              <a:schemeClr val="accent1">
+                <a:shade val="50000"/>
+              </a:schemeClr>
+            </a:lnRef>
+            <a:fillRef idx="1">
+              <a:schemeClr val="accent1"/>
+            </a:fillRef>
+            <a:effectRef idx="0">
+              <a:schemeClr val="accent1"/>
+            </a:effectRef>
+            <a:fontRef idx="minor">
+              <a:schemeClr val="lt1"/>
+            </a:fontRef>
+          </p:style>
           <p:txBody>
-            <a:bodyPr wrap="square" rtlCol="0">
-              <a:spAutoFit/>
-            </a:bodyPr>
+            <a:bodyPr rtlCol="0" anchor="ctr"/>
             <a:lstStyle/>
             <a:p>
-              <a:r>
-                <a:rPr lang="en-US" sz="1600" dirty="0" smtClean="0"/>
-                <a:t>Switch A</a:t>
-              </a:r>
-            </a:p>
-            <a:p>
-              <a:r>
-                <a:rPr lang="en-US" sz="1600" dirty="0" smtClean="0"/>
-                <a:t>Buffer</a:t>
-              </a:r>
-              <a:endParaRPr lang="en-US" sz="1600" dirty="0"/>
-            </a:p>
-          </p:txBody>
-        </p:sp>
-        <p:sp>
-          <p:nvSpPr>
-            <p:cNvPr id="59" name="TextBox 58"/>
-            <p:cNvSpPr txBox="1"/>
-            <p:nvPr/>
-          </p:nvSpPr>
-          <p:spPr>
-            <a:xfrm>
-              <a:off x="5897417" y="4152402"/>
-              <a:ext cx="1585707" cy="338554"/>
-            </a:xfrm>
-            <a:prstGeom prst="rect">
-              <a:avLst/>
-            </a:prstGeom>
-            <a:noFill/>
-          </p:spPr>
-          <p:txBody>
-            <a:bodyPr wrap="square" rtlCol="0">
-              <a:spAutoFit/>
-            </a:bodyPr>
-            <a:lstStyle/>
-            <a:p>
-              <a:r>
-                <a:rPr lang="en-US" sz="1600" dirty="0" smtClean="0"/>
-                <a:t>Switch C buffer</a:t>
-              </a:r>
-              <a:endParaRPr lang="en-US" sz="1600" dirty="0"/>
+              <a:pPr algn="ctr"/>
+              <a:endParaRPr lang="en-US" sz="1200" dirty="0"/>
             </a:p>
           </p:txBody>
         </p:sp>
         <p:cxnSp>
           <p:nvCxnSpPr>
-            <p:cNvPr id="67" name="Straight Arrow Connector 66"/>
+            <p:cNvPr id="11" name="Straight Connector 10"/>
             <p:cNvCxnSpPr/>
             <p:nvPr/>
           </p:nvCxnSpPr>
           <p:spPr>
-            <a:xfrm flipV="1">
-              <a:off x="3875885" y="2627539"/>
-              <a:ext cx="1475464" cy="1139049"/>
+            <a:xfrm>
+              <a:off x="5436017" y="2123061"/>
+              <a:ext cx="0" cy="554653"/>
             </a:xfrm>
-            <a:prstGeom prst="straightConnector1">
+            <a:prstGeom prst="line">
               <a:avLst/>
             </a:prstGeom>
-            <a:ln>
+            <a:ln w="25400">
               <a:solidFill>
                 <a:schemeClr val="tx1"/>
               </a:solidFill>
-              <a:prstDash val="dash"/>
-              <a:tailEnd type="arrow"/>
             </a:ln>
           </p:spPr>
           <p:style>
-            <a:lnRef idx="2">
+            <a:lnRef idx="1">
               <a:schemeClr val="accent1"/>
             </a:lnRef>
             <a:fillRef idx="0">
               <a:schemeClr val="accent1"/>
             </a:fillRef>
-            <a:effectRef idx="1">
+            <a:effectRef idx="0">
               <a:schemeClr val="accent1"/>
             </a:effectRef>
             <a:fontRef idx="minor">
@@ -3994,71 +3197,32 @@
         </p:cxnSp>
         <p:cxnSp>
           <p:nvCxnSpPr>
-            <p:cNvPr id="72" name="Straight Arrow Connector 71"/>
+            <p:cNvPr id="13" name="Straight Connector 12"/>
             <p:cNvCxnSpPr/>
             <p:nvPr/>
           </p:nvCxnSpPr>
           <p:spPr>
             <a:xfrm>
-              <a:off x="5696174" y="2184028"/>
-              <a:ext cx="704955" cy="1997799"/>
+              <a:off x="5780841" y="2134255"/>
+              <a:ext cx="0" cy="554653"/>
             </a:xfrm>
-            <a:prstGeom prst="straightConnector1">
+            <a:prstGeom prst="line">
               <a:avLst/>
             </a:prstGeom>
-            <a:ln>
+            <a:ln w="25400">
               <a:solidFill>
                 <a:schemeClr val="tx1"/>
               </a:solidFill>
-              <a:prstDash val="dash"/>
-              <a:tailEnd type="arrow"/>
             </a:ln>
           </p:spPr>
           <p:style>
-            <a:lnRef idx="2">
+            <a:lnRef idx="1">
               <a:schemeClr val="accent1"/>
             </a:lnRef>
             <a:fillRef idx="0">
               <a:schemeClr val="accent1"/>
             </a:fillRef>
-            <a:effectRef idx="1">
-              <a:schemeClr val="accent1"/>
-            </a:effectRef>
-            <a:fontRef idx="minor">
-              <a:schemeClr val="tx1"/>
-            </a:fontRef>
-          </p:style>
-        </p:cxnSp>
-        <p:cxnSp>
-          <p:nvCxnSpPr>
-            <p:cNvPr id="79" name="Straight Arrow Connector 78"/>
-            <p:cNvCxnSpPr/>
-            <p:nvPr/>
-          </p:nvCxnSpPr>
-          <p:spPr>
-            <a:xfrm flipH="1">
-              <a:off x="3875881" y="3763891"/>
-              <a:ext cx="2525248" cy="388511"/>
-            </a:xfrm>
-            <a:prstGeom prst="straightConnector1">
-              <a:avLst/>
-            </a:prstGeom>
-            <a:ln>
-              <a:solidFill>
-                <a:schemeClr val="tx1"/>
-              </a:solidFill>
-              <a:prstDash val="dash"/>
-              <a:tailEnd type="arrow"/>
-            </a:ln>
-          </p:spPr>
-          <p:style>
-            <a:lnRef idx="2">
-              <a:schemeClr val="accent1"/>
-            </a:lnRef>
-            <a:fillRef idx="0">
-              <a:schemeClr val="accent1"/>
-            </a:fillRef>
-            <a:effectRef idx="1">
+            <a:effectRef idx="0">
               <a:schemeClr val="accent1"/>
             </a:effectRef>
             <a:fontRef idx="minor">
@@ -4068,103 +3232,13 @@
         </p:cxnSp>
         <p:sp>
           <p:nvSpPr>
-            <p:cNvPr id="85" name="TextBox 84"/>
-            <p:cNvSpPr txBox="1"/>
-            <p:nvPr/>
-          </p:nvSpPr>
-          <p:spPr>
-            <a:xfrm>
-              <a:off x="4898192" y="3983125"/>
-              <a:ext cx="925142" cy="338554"/>
-            </a:xfrm>
-            <a:prstGeom prst="rect">
-              <a:avLst/>
-            </a:prstGeom>
-            <a:noFill/>
-          </p:spPr>
-          <p:txBody>
-            <a:bodyPr wrap="square" rtlCol="0">
-              <a:spAutoFit/>
-            </a:bodyPr>
-            <a:lstStyle/>
-            <a:p>
-              <a:r>
-                <a:rPr lang="en-US" sz="1600" dirty="0" smtClean="0"/>
-                <a:t>PAUSE</a:t>
-              </a:r>
-              <a:endParaRPr lang="en-US" sz="1600" dirty="0"/>
-            </a:p>
-          </p:txBody>
-        </p:sp>
-        <p:sp>
-          <p:nvSpPr>
-            <p:cNvPr id="86" name="TextBox 85"/>
-            <p:cNvSpPr txBox="1"/>
-            <p:nvPr/>
-          </p:nvSpPr>
-          <p:spPr>
-            <a:xfrm>
-              <a:off x="3875880" y="2891362"/>
-              <a:ext cx="1022312" cy="338554"/>
-            </a:xfrm>
-            <a:prstGeom prst="rect">
-              <a:avLst/>
-            </a:prstGeom>
-            <a:noFill/>
-          </p:spPr>
-          <p:txBody>
-            <a:bodyPr wrap="square" rtlCol="0">
-              <a:spAutoFit/>
-            </a:bodyPr>
-            <a:lstStyle/>
-            <a:p>
-              <a:r>
-                <a:rPr lang="en-US" sz="1600" dirty="0" smtClean="0"/>
-                <a:t>PAUSE</a:t>
-              </a:r>
-              <a:endParaRPr lang="en-US" sz="1600" dirty="0"/>
-            </a:p>
-          </p:txBody>
-        </p:sp>
-        <p:sp>
-          <p:nvSpPr>
-            <p:cNvPr id="87" name="TextBox 86"/>
-            <p:cNvSpPr txBox="1"/>
-            <p:nvPr/>
-          </p:nvSpPr>
-          <p:spPr>
-            <a:xfrm>
-              <a:off x="6083985" y="2891362"/>
-              <a:ext cx="968833" cy="338554"/>
-            </a:xfrm>
-            <a:prstGeom prst="rect">
-              <a:avLst/>
-            </a:prstGeom>
-            <a:noFill/>
-          </p:spPr>
-          <p:txBody>
-            <a:bodyPr wrap="square" rtlCol="0">
-              <a:spAutoFit/>
-            </a:bodyPr>
-            <a:lstStyle/>
-            <a:p>
-              <a:r>
-                <a:rPr lang="en-US" sz="1600" dirty="0" smtClean="0"/>
-                <a:t>PAUSE</a:t>
-              </a:r>
-              <a:endParaRPr lang="en-US" sz="1600" dirty="0"/>
-            </a:p>
-          </p:txBody>
-        </p:sp>
-        <p:sp>
-          <p:nvSpPr>
-            <p:cNvPr id="88" name="Rectangle 87"/>
+            <p:cNvPr id="14" name="Rectangle 13"/>
             <p:cNvSpPr/>
             <p:nvPr/>
           </p:nvSpPr>
           <p:spPr>
             <a:xfrm rot="5400000">
-              <a:off x="3047450" y="2197783"/>
+              <a:off x="5540345" y="2301051"/>
               <a:ext cx="136168" cy="344824"/>
             </a:xfrm>
             <a:prstGeom prst="rect">
@@ -4209,14 +3283,101 @@
         </p:sp>
         <p:sp>
           <p:nvSpPr>
-            <p:cNvPr id="89" name="TextBox 88"/>
+            <p:cNvPr id="15" name="Rectangle 14"/>
+            <p:cNvSpPr/>
+            <p:nvPr/>
+          </p:nvSpPr>
+          <p:spPr>
+            <a:xfrm rot="5400000">
+              <a:off x="5540345" y="2167449"/>
+              <a:ext cx="136168" cy="344824"/>
+            </a:xfrm>
+            <a:prstGeom prst="rect">
+              <a:avLst/>
+            </a:prstGeom>
+            <a:solidFill>
+              <a:schemeClr val="accent1">
+                <a:lumMod val="60000"/>
+                <a:lumOff val="40000"/>
+              </a:schemeClr>
+            </a:solidFill>
+            <a:ln w="12700">
+              <a:solidFill>
+                <a:schemeClr val="tx1"/>
+              </a:solidFill>
+            </a:ln>
+          </p:spPr>
+          <p:style>
+            <a:lnRef idx="2">
+              <a:schemeClr val="accent1">
+                <a:shade val="50000"/>
+              </a:schemeClr>
+            </a:lnRef>
+            <a:fillRef idx="1">
+              <a:schemeClr val="accent1"/>
+            </a:fillRef>
+            <a:effectRef idx="0">
+              <a:schemeClr val="accent1"/>
+            </a:effectRef>
+            <a:fontRef idx="minor">
+              <a:schemeClr val="lt1"/>
+            </a:fontRef>
+          </p:style>
+          <p:txBody>
+            <a:bodyPr rtlCol="0" anchor="ctr"/>
+            <a:lstStyle/>
+            <a:p>
+              <a:pPr algn="ctr"/>
+              <a:endParaRPr lang="en-US" sz="1200" dirty="0"/>
+            </a:p>
+          </p:txBody>
+        </p:sp>
+        <p:cxnSp>
+          <p:nvCxnSpPr>
+            <p:cNvPr id="16" name="Straight Connector 15"/>
+            <p:cNvCxnSpPr/>
+            <p:nvPr/>
+          </p:nvCxnSpPr>
+          <p:spPr>
+            <a:xfrm>
+              <a:off x="5285176" y="2271777"/>
+              <a:ext cx="696908" cy="0"/>
+            </a:xfrm>
+            <a:prstGeom prst="line">
+              <a:avLst/>
+            </a:prstGeom>
+            <a:ln w="50800">
+              <a:solidFill>
+                <a:srgbClr val="FF0000"/>
+              </a:solidFill>
+              <a:prstDash val="sysDash"/>
+            </a:ln>
+          </p:spPr>
+          <p:style>
+            <a:lnRef idx="1">
+              <a:schemeClr val="accent1"/>
+            </a:lnRef>
+            <a:fillRef idx="0">
+              <a:schemeClr val="accent1"/>
+            </a:fillRef>
+            <a:effectRef idx="0">
+              <a:schemeClr val="accent1"/>
+            </a:effectRef>
+            <a:fontRef idx="minor">
+              <a:schemeClr val="tx1"/>
+            </a:fontRef>
+          </p:style>
+        </p:cxnSp>
+        <p:sp>
+          <p:nvSpPr>
+            <p:cNvPr id="21" name="TextBox 20"/>
             <p:cNvSpPr txBox="1"/>
             <p:nvPr/>
           </p:nvSpPr>
           <p:spPr>
             <a:xfrm>
-              <a:off x="3271813" y="2124067"/>
-              <a:ext cx="1380923" cy="523220"/>
+              <a:off x="5908001" y="2108083"/>
+              <a:ext cx="1376417" cy="307777"/>
             </a:xfrm>
             <a:prstGeom prst="rect">
               <a:avLst/>
@@ -4231,49 +3392,875 @@
             <a:p>
               <a:r>
                 <a:rPr lang="en-US" sz="1400" dirty="0" smtClean="0"/>
-                <a:t>Packets </a:t>
-              </a:r>
-            </a:p>
-            <a:p>
-              <a:r>
-                <a:rPr lang="en-US" sz="1400" dirty="0" smtClean="0"/>
-                <a:t>A-&gt;B-&gt;C-&gt;A</a:t>
+                <a:t>PFC threshold</a:t>
               </a:r>
               <a:endParaRPr lang="en-US" sz="1400" dirty="0"/>
             </a:p>
           </p:txBody>
         </p:sp>
+      </p:grpSp>
+      <p:grpSp>
+        <p:nvGrpSpPr>
+          <p:cNvPr id="25" name="Group 24"/>
+          <p:cNvGrpSpPr/>
+          <p:nvPr/>
+        </p:nvGrpSpPr>
+        <p:grpSpPr>
+          <a:xfrm>
+            <a:off x="3531060" y="3615980"/>
+            <a:ext cx="344825" cy="565847"/>
+            <a:chOff x="5436016" y="2123061"/>
+            <a:chExt cx="344825" cy="565847"/>
+          </a:xfrm>
+        </p:grpSpPr>
         <p:sp>
           <p:nvSpPr>
-            <p:cNvPr id="90" name="TextBox 89"/>
-            <p:cNvSpPr txBox="1"/>
+            <p:cNvPr id="26" name="Rectangle 25"/>
+            <p:cNvSpPr/>
             <p:nvPr/>
           </p:nvSpPr>
           <p:spPr>
-            <a:xfrm>
-              <a:off x="2957304" y="4152402"/>
-              <a:ext cx="1671108" cy="338554"/>
+            <a:xfrm rot="5400000">
+              <a:off x="5540344" y="2437219"/>
+              <a:ext cx="136168" cy="344824"/>
             </a:xfrm>
             <a:prstGeom prst="rect">
               <a:avLst/>
             </a:prstGeom>
-            <a:noFill/>
+            <a:solidFill>
+              <a:schemeClr val="accent1">
+                <a:lumMod val="60000"/>
+                <a:lumOff val="40000"/>
+              </a:schemeClr>
+            </a:solidFill>
+            <a:ln w="12700">
+              <a:solidFill>
+                <a:schemeClr val="tx1"/>
+              </a:solidFill>
+            </a:ln>
           </p:spPr>
+          <p:style>
+            <a:lnRef idx="2">
+              <a:schemeClr val="accent1">
+                <a:shade val="50000"/>
+              </a:schemeClr>
+            </a:lnRef>
+            <a:fillRef idx="1">
+              <a:schemeClr val="accent1"/>
+            </a:fillRef>
+            <a:effectRef idx="0">
+              <a:schemeClr val="accent1"/>
+            </a:effectRef>
+            <a:fontRef idx="minor">
+              <a:schemeClr val="lt1"/>
+            </a:fontRef>
+          </p:style>
           <p:txBody>
-            <a:bodyPr wrap="square" rtlCol="0">
-              <a:spAutoFit/>
-            </a:bodyPr>
+            <a:bodyPr rtlCol="0" anchor="ctr"/>
             <a:lstStyle/>
             <a:p>
-              <a:r>
-                <a:rPr lang="en-US" sz="1600" dirty="0" smtClean="0"/>
-                <a:t>Switch B buffer</a:t>
-              </a:r>
-              <a:endParaRPr lang="en-US" sz="1600" dirty="0"/>
+              <a:pPr algn="ctr"/>
+              <a:endParaRPr lang="en-US" sz="1200" dirty="0"/>
+            </a:p>
+          </p:txBody>
+        </p:sp>
+        <p:cxnSp>
+          <p:nvCxnSpPr>
+            <p:cNvPr id="27" name="Straight Connector 26"/>
+            <p:cNvCxnSpPr/>
+            <p:nvPr/>
+          </p:nvCxnSpPr>
+          <p:spPr>
+            <a:xfrm>
+              <a:off x="5436017" y="2123061"/>
+              <a:ext cx="0" cy="554653"/>
+            </a:xfrm>
+            <a:prstGeom prst="line">
+              <a:avLst/>
+            </a:prstGeom>
+            <a:ln w="25400">
+              <a:solidFill>
+                <a:schemeClr val="tx1"/>
+              </a:solidFill>
+            </a:ln>
+          </p:spPr>
+          <p:style>
+            <a:lnRef idx="1">
+              <a:schemeClr val="accent1"/>
+            </a:lnRef>
+            <a:fillRef idx="0">
+              <a:schemeClr val="accent1"/>
+            </a:fillRef>
+            <a:effectRef idx="0">
+              <a:schemeClr val="accent1"/>
+            </a:effectRef>
+            <a:fontRef idx="minor">
+              <a:schemeClr val="tx1"/>
+            </a:fontRef>
+          </p:style>
+        </p:cxnSp>
+        <p:cxnSp>
+          <p:nvCxnSpPr>
+            <p:cNvPr id="28" name="Straight Connector 27"/>
+            <p:cNvCxnSpPr/>
+            <p:nvPr/>
+          </p:nvCxnSpPr>
+          <p:spPr>
+            <a:xfrm>
+              <a:off x="5780841" y="2134255"/>
+              <a:ext cx="0" cy="554653"/>
+            </a:xfrm>
+            <a:prstGeom prst="line">
+              <a:avLst/>
+            </a:prstGeom>
+            <a:ln w="25400">
+              <a:solidFill>
+                <a:schemeClr val="tx1"/>
+              </a:solidFill>
+            </a:ln>
+          </p:spPr>
+          <p:style>
+            <a:lnRef idx="1">
+              <a:schemeClr val="accent1"/>
+            </a:lnRef>
+            <a:fillRef idx="0">
+              <a:schemeClr val="accent1"/>
+            </a:fillRef>
+            <a:effectRef idx="0">
+              <a:schemeClr val="accent1"/>
+            </a:effectRef>
+            <a:fontRef idx="minor">
+              <a:schemeClr val="tx1"/>
+            </a:fontRef>
+          </p:style>
+        </p:cxnSp>
+        <p:sp>
+          <p:nvSpPr>
+            <p:cNvPr id="29" name="Rectangle 28"/>
+            <p:cNvSpPr/>
+            <p:nvPr/>
+          </p:nvSpPr>
+          <p:spPr>
+            <a:xfrm rot="5400000">
+              <a:off x="5540345" y="2301051"/>
+              <a:ext cx="136168" cy="344824"/>
+            </a:xfrm>
+            <a:prstGeom prst="rect">
+              <a:avLst/>
+            </a:prstGeom>
+            <a:solidFill>
+              <a:schemeClr val="accent1">
+                <a:lumMod val="60000"/>
+                <a:lumOff val="40000"/>
+              </a:schemeClr>
+            </a:solidFill>
+            <a:ln w="12700">
+              <a:solidFill>
+                <a:schemeClr val="tx1"/>
+              </a:solidFill>
+            </a:ln>
+          </p:spPr>
+          <p:style>
+            <a:lnRef idx="2">
+              <a:schemeClr val="accent1">
+                <a:shade val="50000"/>
+              </a:schemeClr>
+            </a:lnRef>
+            <a:fillRef idx="1">
+              <a:schemeClr val="accent1"/>
+            </a:fillRef>
+            <a:effectRef idx="0">
+              <a:schemeClr val="accent1"/>
+            </a:effectRef>
+            <a:fontRef idx="minor">
+              <a:schemeClr val="lt1"/>
+            </a:fontRef>
+          </p:style>
+          <p:txBody>
+            <a:bodyPr rtlCol="0" anchor="ctr"/>
+            <a:lstStyle/>
+            <a:p>
+              <a:pPr algn="ctr"/>
+              <a:endParaRPr lang="en-US" sz="1200" dirty="0"/>
+            </a:p>
+          </p:txBody>
+        </p:sp>
+        <p:sp>
+          <p:nvSpPr>
+            <p:cNvPr id="30" name="Rectangle 29"/>
+            <p:cNvSpPr/>
+            <p:nvPr/>
+          </p:nvSpPr>
+          <p:spPr>
+            <a:xfrm rot="5400000">
+              <a:off x="5540345" y="2167449"/>
+              <a:ext cx="136168" cy="344824"/>
+            </a:xfrm>
+            <a:prstGeom prst="rect">
+              <a:avLst/>
+            </a:prstGeom>
+            <a:solidFill>
+              <a:schemeClr val="accent1">
+                <a:lumMod val="60000"/>
+                <a:lumOff val="40000"/>
+              </a:schemeClr>
+            </a:solidFill>
+            <a:ln w="12700">
+              <a:solidFill>
+                <a:schemeClr val="tx1"/>
+              </a:solidFill>
+            </a:ln>
+          </p:spPr>
+          <p:style>
+            <a:lnRef idx="2">
+              <a:schemeClr val="accent1">
+                <a:shade val="50000"/>
+              </a:schemeClr>
+            </a:lnRef>
+            <a:fillRef idx="1">
+              <a:schemeClr val="accent1"/>
+            </a:fillRef>
+            <a:effectRef idx="0">
+              <a:schemeClr val="accent1"/>
+            </a:effectRef>
+            <a:fontRef idx="minor">
+              <a:schemeClr val="lt1"/>
+            </a:fontRef>
+          </p:style>
+          <p:txBody>
+            <a:bodyPr rtlCol="0" anchor="ctr"/>
+            <a:lstStyle/>
+            <a:p>
+              <a:pPr algn="ctr"/>
+              <a:endParaRPr lang="en-US" sz="1200" dirty="0"/>
             </a:p>
           </p:txBody>
         </p:sp>
       </p:grpSp>
+      <p:grpSp>
+        <p:nvGrpSpPr>
+          <p:cNvPr id="33" name="Group 32"/>
+          <p:cNvGrpSpPr/>
+          <p:nvPr/>
+        </p:nvGrpSpPr>
+        <p:grpSpPr>
+          <a:xfrm>
+            <a:off x="6401129" y="3599340"/>
+            <a:ext cx="344825" cy="565847"/>
+            <a:chOff x="5436016" y="2123061"/>
+            <a:chExt cx="344825" cy="565847"/>
+          </a:xfrm>
+        </p:grpSpPr>
+        <p:sp>
+          <p:nvSpPr>
+            <p:cNvPr id="34" name="Rectangle 33"/>
+            <p:cNvSpPr/>
+            <p:nvPr/>
+          </p:nvSpPr>
+          <p:spPr>
+            <a:xfrm rot="5400000">
+              <a:off x="5540344" y="2437219"/>
+              <a:ext cx="136168" cy="344824"/>
+            </a:xfrm>
+            <a:prstGeom prst="rect">
+              <a:avLst/>
+            </a:prstGeom>
+            <a:solidFill>
+              <a:schemeClr val="accent1">
+                <a:lumMod val="60000"/>
+                <a:lumOff val="40000"/>
+              </a:schemeClr>
+            </a:solidFill>
+            <a:ln w="12700">
+              <a:solidFill>
+                <a:schemeClr val="tx1"/>
+              </a:solidFill>
+            </a:ln>
+          </p:spPr>
+          <p:style>
+            <a:lnRef idx="2">
+              <a:schemeClr val="accent1">
+                <a:shade val="50000"/>
+              </a:schemeClr>
+            </a:lnRef>
+            <a:fillRef idx="1">
+              <a:schemeClr val="accent1"/>
+            </a:fillRef>
+            <a:effectRef idx="0">
+              <a:schemeClr val="accent1"/>
+            </a:effectRef>
+            <a:fontRef idx="minor">
+              <a:schemeClr val="lt1"/>
+            </a:fontRef>
+          </p:style>
+          <p:txBody>
+            <a:bodyPr rtlCol="0" anchor="ctr"/>
+            <a:lstStyle/>
+            <a:p>
+              <a:pPr algn="ctr"/>
+              <a:endParaRPr lang="en-US" sz="1200" dirty="0"/>
+            </a:p>
+          </p:txBody>
+        </p:sp>
+        <p:cxnSp>
+          <p:nvCxnSpPr>
+            <p:cNvPr id="35" name="Straight Connector 34"/>
+            <p:cNvCxnSpPr/>
+            <p:nvPr/>
+          </p:nvCxnSpPr>
+          <p:spPr>
+            <a:xfrm>
+              <a:off x="5436017" y="2123061"/>
+              <a:ext cx="0" cy="554653"/>
+            </a:xfrm>
+            <a:prstGeom prst="line">
+              <a:avLst/>
+            </a:prstGeom>
+            <a:ln w="25400">
+              <a:solidFill>
+                <a:schemeClr val="tx1"/>
+              </a:solidFill>
+            </a:ln>
+          </p:spPr>
+          <p:style>
+            <a:lnRef idx="1">
+              <a:schemeClr val="accent1"/>
+            </a:lnRef>
+            <a:fillRef idx="0">
+              <a:schemeClr val="accent1"/>
+            </a:fillRef>
+            <a:effectRef idx="0">
+              <a:schemeClr val="accent1"/>
+            </a:effectRef>
+            <a:fontRef idx="minor">
+              <a:schemeClr val="tx1"/>
+            </a:fontRef>
+          </p:style>
+        </p:cxnSp>
+        <p:cxnSp>
+          <p:nvCxnSpPr>
+            <p:cNvPr id="36" name="Straight Connector 35"/>
+            <p:cNvCxnSpPr/>
+            <p:nvPr/>
+          </p:nvCxnSpPr>
+          <p:spPr>
+            <a:xfrm>
+              <a:off x="5780841" y="2134255"/>
+              <a:ext cx="0" cy="554653"/>
+            </a:xfrm>
+            <a:prstGeom prst="line">
+              <a:avLst/>
+            </a:prstGeom>
+            <a:ln w="25400">
+              <a:solidFill>
+                <a:schemeClr val="tx1"/>
+              </a:solidFill>
+            </a:ln>
+          </p:spPr>
+          <p:style>
+            <a:lnRef idx="1">
+              <a:schemeClr val="accent1"/>
+            </a:lnRef>
+            <a:fillRef idx="0">
+              <a:schemeClr val="accent1"/>
+            </a:fillRef>
+            <a:effectRef idx="0">
+              <a:schemeClr val="accent1"/>
+            </a:effectRef>
+            <a:fontRef idx="minor">
+              <a:schemeClr val="tx1"/>
+            </a:fontRef>
+          </p:style>
+        </p:cxnSp>
+        <p:sp>
+          <p:nvSpPr>
+            <p:cNvPr id="37" name="Rectangle 36"/>
+            <p:cNvSpPr/>
+            <p:nvPr/>
+          </p:nvSpPr>
+          <p:spPr>
+            <a:xfrm rot="5400000">
+              <a:off x="5540345" y="2301051"/>
+              <a:ext cx="136168" cy="344824"/>
+            </a:xfrm>
+            <a:prstGeom prst="rect">
+              <a:avLst/>
+            </a:prstGeom>
+            <a:solidFill>
+              <a:schemeClr val="accent1">
+                <a:lumMod val="60000"/>
+                <a:lumOff val="40000"/>
+              </a:schemeClr>
+            </a:solidFill>
+            <a:ln w="12700">
+              <a:solidFill>
+                <a:schemeClr val="tx1"/>
+              </a:solidFill>
+            </a:ln>
+          </p:spPr>
+          <p:style>
+            <a:lnRef idx="2">
+              <a:schemeClr val="accent1">
+                <a:shade val="50000"/>
+              </a:schemeClr>
+            </a:lnRef>
+            <a:fillRef idx="1">
+              <a:schemeClr val="accent1"/>
+            </a:fillRef>
+            <a:effectRef idx="0">
+              <a:schemeClr val="accent1"/>
+            </a:effectRef>
+            <a:fontRef idx="minor">
+              <a:schemeClr val="lt1"/>
+            </a:fontRef>
+          </p:style>
+          <p:txBody>
+            <a:bodyPr rtlCol="0" anchor="ctr"/>
+            <a:lstStyle/>
+            <a:p>
+              <a:pPr algn="ctr"/>
+              <a:endParaRPr lang="en-US" sz="1200" dirty="0"/>
+            </a:p>
+          </p:txBody>
+        </p:sp>
+        <p:sp>
+          <p:nvSpPr>
+            <p:cNvPr id="38" name="Rectangle 37"/>
+            <p:cNvSpPr/>
+            <p:nvPr/>
+          </p:nvSpPr>
+          <p:spPr>
+            <a:xfrm rot="5400000">
+              <a:off x="5540345" y="2167449"/>
+              <a:ext cx="136168" cy="344824"/>
+            </a:xfrm>
+            <a:prstGeom prst="rect">
+              <a:avLst/>
+            </a:prstGeom>
+            <a:solidFill>
+              <a:schemeClr val="accent1">
+                <a:lumMod val="60000"/>
+                <a:lumOff val="40000"/>
+              </a:schemeClr>
+            </a:solidFill>
+            <a:ln w="12700">
+              <a:solidFill>
+                <a:schemeClr val="tx1"/>
+              </a:solidFill>
+            </a:ln>
+          </p:spPr>
+          <p:style>
+            <a:lnRef idx="2">
+              <a:schemeClr val="accent1">
+                <a:shade val="50000"/>
+              </a:schemeClr>
+            </a:lnRef>
+            <a:fillRef idx="1">
+              <a:schemeClr val="accent1"/>
+            </a:fillRef>
+            <a:effectRef idx="0">
+              <a:schemeClr val="accent1"/>
+            </a:effectRef>
+            <a:fontRef idx="minor">
+              <a:schemeClr val="lt1"/>
+            </a:fontRef>
+          </p:style>
+          <p:txBody>
+            <a:bodyPr rtlCol="0" anchor="ctr"/>
+            <a:lstStyle/>
+            <a:p>
+              <a:pPr algn="ctr"/>
+              <a:endParaRPr lang="en-US" sz="1200" dirty="0"/>
+            </a:p>
+          </p:txBody>
+        </p:sp>
+      </p:grpSp>
+      <p:sp>
+        <p:nvSpPr>
+          <p:cNvPr id="57" name="TextBox 56"/>
+          <p:cNvSpPr txBox="1"/>
+          <p:nvPr/>
+        </p:nvSpPr>
+        <p:spPr>
+          <a:xfrm>
+            <a:off x="4262787" y="2311103"/>
+            <a:ext cx="1016532" cy="584776"/>
+          </a:xfrm>
+          <a:prstGeom prst="rect">
+            <a:avLst/>
+          </a:prstGeom>
+          <a:noFill/>
+        </p:spPr>
+        <p:txBody>
+          <a:bodyPr wrap="square" rtlCol="0">
+            <a:spAutoFit/>
+          </a:bodyPr>
+          <a:lstStyle/>
+          <a:p>
+            <a:pPr algn="ctr"/>
+            <a:r>
+              <a:rPr lang="en-US" sz="1600" dirty="0" smtClean="0"/>
+              <a:t>Switch A</a:t>
+            </a:r>
+          </a:p>
+          <a:p>
+            <a:pPr algn="ctr"/>
+            <a:r>
+              <a:rPr lang="en-US" sz="1600" dirty="0" smtClean="0"/>
+              <a:t>buffer</a:t>
+            </a:r>
+            <a:endParaRPr lang="en-US" sz="1600" dirty="0"/>
+          </a:p>
+        </p:txBody>
+      </p:sp>
+      <p:sp>
+        <p:nvSpPr>
+          <p:cNvPr id="59" name="TextBox 58"/>
+          <p:cNvSpPr txBox="1"/>
+          <p:nvPr/>
+        </p:nvSpPr>
+        <p:spPr>
+          <a:xfrm>
+            <a:off x="5897417" y="4152402"/>
+            <a:ext cx="1585707" cy="338554"/>
+          </a:xfrm>
+          <a:prstGeom prst="rect">
+            <a:avLst/>
+          </a:prstGeom>
+          <a:noFill/>
+        </p:spPr>
+        <p:txBody>
+          <a:bodyPr wrap="square" rtlCol="0">
+            <a:spAutoFit/>
+          </a:bodyPr>
+          <a:lstStyle/>
+          <a:p>
+            <a:r>
+              <a:rPr lang="en-US" sz="1600" dirty="0" smtClean="0"/>
+              <a:t>Switch C buffer</a:t>
+            </a:r>
+            <a:endParaRPr lang="en-US" sz="1600" dirty="0"/>
+          </a:p>
+        </p:txBody>
+      </p:sp>
+      <p:cxnSp>
+        <p:nvCxnSpPr>
+          <p:cNvPr id="67" name="Straight Arrow Connector 66"/>
+          <p:cNvCxnSpPr/>
+          <p:nvPr/>
+        </p:nvCxnSpPr>
+        <p:spPr>
+          <a:xfrm flipV="1">
+            <a:off x="3875885" y="2901264"/>
+            <a:ext cx="1486413" cy="865325"/>
+          </a:xfrm>
+          <a:prstGeom prst="straightConnector1">
+            <a:avLst/>
+          </a:prstGeom>
+          <a:ln>
+            <a:solidFill>
+              <a:schemeClr val="tx1"/>
+            </a:solidFill>
+            <a:prstDash val="dash"/>
+            <a:tailEnd type="arrow"/>
+          </a:ln>
+        </p:spPr>
+        <p:style>
+          <a:lnRef idx="2">
+            <a:schemeClr val="accent1"/>
+          </a:lnRef>
+          <a:fillRef idx="0">
+            <a:schemeClr val="accent1"/>
+          </a:fillRef>
+          <a:effectRef idx="1">
+            <a:schemeClr val="accent1"/>
+          </a:effectRef>
+          <a:fontRef idx="minor">
+            <a:schemeClr val="tx1"/>
+          </a:fontRef>
+        </p:style>
+      </p:cxnSp>
+      <p:cxnSp>
+        <p:nvCxnSpPr>
+          <p:cNvPr id="72" name="Straight Arrow Connector 71"/>
+          <p:cNvCxnSpPr/>
+          <p:nvPr/>
+        </p:nvCxnSpPr>
+        <p:spPr>
+          <a:xfrm>
+            <a:off x="5707122" y="2486523"/>
+            <a:ext cx="694008" cy="1684111"/>
+          </a:xfrm>
+          <a:prstGeom prst="straightConnector1">
+            <a:avLst/>
+          </a:prstGeom>
+          <a:ln>
+            <a:solidFill>
+              <a:schemeClr val="tx1"/>
+            </a:solidFill>
+            <a:prstDash val="dash"/>
+            <a:tailEnd type="arrow"/>
+          </a:ln>
+        </p:spPr>
+        <p:style>
+          <a:lnRef idx="2">
+            <a:schemeClr val="accent1"/>
+          </a:lnRef>
+          <a:fillRef idx="0">
+            <a:schemeClr val="accent1"/>
+          </a:fillRef>
+          <a:effectRef idx="1">
+            <a:schemeClr val="accent1"/>
+          </a:effectRef>
+          <a:fontRef idx="minor">
+            <a:schemeClr val="tx1"/>
+          </a:fontRef>
+        </p:style>
+      </p:cxnSp>
+      <p:cxnSp>
+        <p:nvCxnSpPr>
+          <p:cNvPr id="79" name="Straight Arrow Connector 78"/>
+          <p:cNvCxnSpPr/>
+          <p:nvPr/>
+        </p:nvCxnSpPr>
+        <p:spPr>
+          <a:xfrm flipH="1">
+            <a:off x="3875881" y="3763891"/>
+            <a:ext cx="2525248" cy="388511"/>
+          </a:xfrm>
+          <a:prstGeom prst="straightConnector1">
+            <a:avLst/>
+          </a:prstGeom>
+          <a:ln>
+            <a:solidFill>
+              <a:schemeClr val="tx1"/>
+            </a:solidFill>
+            <a:prstDash val="dash"/>
+            <a:tailEnd type="arrow"/>
+          </a:ln>
+        </p:spPr>
+        <p:style>
+          <a:lnRef idx="2">
+            <a:schemeClr val="accent1"/>
+          </a:lnRef>
+          <a:fillRef idx="0">
+            <a:schemeClr val="accent1"/>
+          </a:fillRef>
+          <a:effectRef idx="1">
+            <a:schemeClr val="accent1"/>
+          </a:effectRef>
+          <a:fontRef idx="minor">
+            <a:schemeClr val="tx1"/>
+          </a:fontRef>
+        </p:style>
+      </p:cxnSp>
+      <p:sp>
+        <p:nvSpPr>
+          <p:cNvPr id="85" name="TextBox 84"/>
+          <p:cNvSpPr txBox="1"/>
+          <p:nvPr/>
+        </p:nvSpPr>
+        <p:spPr>
+          <a:xfrm>
+            <a:off x="4898192" y="3950278"/>
+            <a:ext cx="925142" cy="338554"/>
+          </a:xfrm>
+          <a:prstGeom prst="rect">
+            <a:avLst/>
+          </a:prstGeom>
+          <a:noFill/>
+        </p:spPr>
+        <p:txBody>
+          <a:bodyPr wrap="square" rtlCol="0">
+            <a:spAutoFit/>
+          </a:bodyPr>
+          <a:lstStyle/>
+          <a:p>
+            <a:r>
+              <a:rPr lang="en-US" sz="1600" dirty="0" smtClean="0"/>
+              <a:t>PAUSE</a:t>
+            </a:r>
+            <a:endParaRPr lang="en-US" sz="1600" dirty="0"/>
+          </a:p>
+        </p:txBody>
+      </p:sp>
+      <p:sp>
+        <p:nvSpPr>
+          <p:cNvPr id="86" name="TextBox 85"/>
+          <p:cNvSpPr txBox="1"/>
+          <p:nvPr/>
+        </p:nvSpPr>
+        <p:spPr>
+          <a:xfrm>
+            <a:off x="3979669" y="3016843"/>
+            <a:ext cx="1022312" cy="338554"/>
+          </a:xfrm>
+          <a:prstGeom prst="rect">
+            <a:avLst/>
+          </a:prstGeom>
+          <a:noFill/>
+        </p:spPr>
+        <p:txBody>
+          <a:bodyPr wrap="square" rtlCol="0">
+            <a:spAutoFit/>
+          </a:bodyPr>
+          <a:lstStyle/>
+          <a:p>
+            <a:r>
+              <a:rPr lang="en-US" sz="1600" dirty="0" smtClean="0"/>
+              <a:t>PAUSE</a:t>
+            </a:r>
+            <a:endParaRPr lang="en-US" sz="1600" dirty="0"/>
+          </a:p>
+        </p:txBody>
+      </p:sp>
+      <p:sp>
+        <p:nvSpPr>
+          <p:cNvPr id="87" name="TextBox 86"/>
+          <p:cNvSpPr txBox="1"/>
+          <p:nvPr/>
+        </p:nvSpPr>
+        <p:spPr>
+          <a:xfrm>
+            <a:off x="6004216" y="3016843"/>
+            <a:ext cx="968833" cy="338554"/>
+          </a:xfrm>
+          <a:prstGeom prst="rect">
+            <a:avLst/>
+          </a:prstGeom>
+          <a:noFill/>
+        </p:spPr>
+        <p:txBody>
+          <a:bodyPr wrap="square" rtlCol="0">
+            <a:spAutoFit/>
+          </a:bodyPr>
+          <a:lstStyle/>
+          <a:p>
+            <a:r>
+              <a:rPr lang="en-US" sz="1600" dirty="0" smtClean="0"/>
+              <a:t>PAUSE</a:t>
+            </a:r>
+            <a:endParaRPr lang="en-US" sz="1600" dirty="0"/>
+          </a:p>
+        </p:txBody>
+      </p:sp>
+      <p:sp>
+        <p:nvSpPr>
+          <p:cNvPr id="88" name="Rectangle 87"/>
+          <p:cNvSpPr/>
+          <p:nvPr/>
+        </p:nvSpPr>
+        <p:spPr>
+          <a:xfrm rot="5400000">
+            <a:off x="2828490" y="2445323"/>
+            <a:ext cx="136168" cy="344824"/>
+          </a:xfrm>
+          <a:prstGeom prst="rect">
+            <a:avLst/>
+          </a:prstGeom>
+          <a:solidFill>
+            <a:schemeClr val="accent1">
+              <a:lumMod val="60000"/>
+              <a:lumOff val="40000"/>
+            </a:schemeClr>
+          </a:solidFill>
+          <a:ln w="12700">
+            <a:solidFill>
+              <a:schemeClr val="tx1"/>
+            </a:solidFill>
+          </a:ln>
+        </p:spPr>
+        <p:style>
+          <a:lnRef idx="2">
+            <a:schemeClr val="accent1">
+              <a:shade val="50000"/>
+            </a:schemeClr>
+          </a:lnRef>
+          <a:fillRef idx="1">
+            <a:schemeClr val="accent1"/>
+          </a:fillRef>
+          <a:effectRef idx="0">
+            <a:schemeClr val="accent1"/>
+          </a:effectRef>
+          <a:fontRef idx="minor">
+            <a:schemeClr val="lt1"/>
+          </a:fontRef>
+        </p:style>
+        <p:txBody>
+          <a:bodyPr rtlCol="0" anchor="ctr"/>
+          <a:lstStyle/>
+          <a:p>
+            <a:pPr algn="ctr"/>
+            <a:endParaRPr lang="en-US" sz="1200" dirty="0"/>
+          </a:p>
+        </p:txBody>
+      </p:sp>
+      <p:sp>
+        <p:nvSpPr>
+          <p:cNvPr id="89" name="TextBox 88"/>
+          <p:cNvSpPr txBox="1"/>
+          <p:nvPr/>
+        </p:nvSpPr>
+        <p:spPr>
+          <a:xfrm>
+            <a:off x="3058038" y="2330932"/>
+            <a:ext cx="1380923" cy="523220"/>
+          </a:xfrm>
+          <a:prstGeom prst="rect">
+            <a:avLst/>
+          </a:prstGeom>
+          <a:noFill/>
+        </p:spPr>
+        <p:txBody>
+          <a:bodyPr wrap="square" rtlCol="0">
+            <a:spAutoFit/>
+          </a:bodyPr>
+          <a:lstStyle/>
+          <a:p>
+            <a:r>
+              <a:rPr lang="en-US" sz="1400" dirty="0" smtClean="0"/>
+              <a:t>Packets </a:t>
+            </a:r>
+          </a:p>
+          <a:p>
+            <a:r>
+              <a:rPr lang="en-US" sz="1400" dirty="0" smtClean="0"/>
+              <a:t>A-&gt;B-&gt;C-&gt;A</a:t>
+            </a:r>
+            <a:endParaRPr lang="en-US" sz="1400" dirty="0"/>
+          </a:p>
+        </p:txBody>
+      </p:sp>
+      <p:sp>
+        <p:nvSpPr>
+          <p:cNvPr id="90" name="TextBox 89"/>
+          <p:cNvSpPr txBox="1"/>
+          <p:nvPr/>
+        </p:nvSpPr>
+        <p:spPr>
+          <a:xfrm>
+            <a:off x="2957304" y="4152402"/>
+            <a:ext cx="1671108" cy="338554"/>
+          </a:xfrm>
+          <a:prstGeom prst="rect">
+            <a:avLst/>
+          </a:prstGeom>
+          <a:noFill/>
+        </p:spPr>
+        <p:txBody>
+          <a:bodyPr wrap="square" rtlCol="0">
+            <a:spAutoFit/>
+          </a:bodyPr>
+          <a:lstStyle/>
+          <a:p>
+            <a:r>
+              <a:rPr lang="en-US" sz="1600" dirty="0" smtClean="0"/>
+              <a:t>Switch B buffer</a:t>
+            </a:r>
+            <a:endParaRPr lang="en-US" sz="1600" dirty="0"/>
+          </a:p>
+        </p:txBody>
+      </p:sp>
       <p:cxnSp>
         <p:nvCxnSpPr>
           <p:cNvPr id="96" name="Straight Connector 95"/>

</xml_diff>